<commit_message>
Agregado "Fast load times" a material recomendado en JavaScript
</commit_message>
<xml_diff>
--- a/Presentaciones/Formación Desarrollo Web (JavaScript).pptx
+++ b/Presentaciones/Formación Desarrollo Web (JavaScript).pptx
@@ -232,7 +232,7 @@
           <a:p>
             <a:fld id="{47AF9C49-16DC-4B67-A5F1-A80AB5AD5C2F}" type="datetimeFigureOut">
               <a:rPr lang="es-ES" smtClean="0"/>
-              <a:t>05/04/2020</a:t>
+              <a:t>07/04/2020</a:t>
             </a:fld>
             <a:endParaRPr lang="es-ES"/>
           </a:p>
@@ -1240,7 +1240,7 @@
           <a:p>
             <a:fld id="{232F3880-77D8-4D9E-BC7C-9E52EB9D8497}" type="datetimeFigureOut">
               <a:rPr lang="es-ES" smtClean="0"/>
-              <a:t>05/04/2020</a:t>
+              <a:t>07/04/2020</a:t>
             </a:fld>
             <a:endParaRPr lang="es-ES"/>
           </a:p>
@@ -1448,7 +1448,7 @@
           <a:p>
             <a:fld id="{232F3880-77D8-4D9E-BC7C-9E52EB9D8497}" type="datetimeFigureOut">
               <a:rPr lang="es-ES" smtClean="0"/>
-              <a:t>05/04/2020</a:t>
+              <a:t>07/04/2020</a:t>
             </a:fld>
             <a:endParaRPr lang="es-ES"/>
           </a:p>
@@ -1704,7 +1704,7 @@
           <a:p>
             <a:fld id="{232F3880-77D8-4D9E-BC7C-9E52EB9D8497}" type="datetimeFigureOut">
               <a:rPr lang="es-ES" smtClean="0"/>
-              <a:t>05/04/2020</a:t>
+              <a:t>07/04/2020</a:t>
             </a:fld>
             <a:endParaRPr lang="es-ES"/>
           </a:p>
@@ -1878,7 +1878,7 @@
           <a:p>
             <a:fld id="{232F3880-77D8-4D9E-BC7C-9E52EB9D8497}" type="datetimeFigureOut">
               <a:rPr lang="es-ES" smtClean="0"/>
-              <a:t>05/04/2020</a:t>
+              <a:t>07/04/2020</a:t>
             </a:fld>
             <a:endParaRPr lang="es-ES"/>
           </a:p>
@@ -2221,7 +2221,7 @@
           <a:p>
             <a:fld id="{232F3880-77D8-4D9E-BC7C-9E52EB9D8497}" type="datetimeFigureOut">
               <a:rPr lang="es-ES" smtClean="0"/>
-              <a:t>05/04/2020</a:t>
+              <a:t>07/04/2020</a:t>
             </a:fld>
             <a:endParaRPr lang="es-ES"/>
           </a:p>
@@ -2496,7 +2496,7 @@
           <a:p>
             <a:fld id="{232F3880-77D8-4D9E-BC7C-9E52EB9D8497}" type="datetimeFigureOut">
               <a:rPr lang="es-ES" smtClean="0"/>
-              <a:t>05/04/2020</a:t>
+              <a:t>07/04/2020</a:t>
             </a:fld>
             <a:endParaRPr lang="es-ES"/>
           </a:p>
@@ -2875,7 +2875,7 @@
           <a:p>
             <a:fld id="{232F3880-77D8-4D9E-BC7C-9E52EB9D8497}" type="datetimeFigureOut">
               <a:rPr lang="es-ES" smtClean="0"/>
-              <a:t>05/04/2020</a:t>
+              <a:t>07/04/2020</a:t>
             </a:fld>
             <a:endParaRPr lang="es-ES"/>
           </a:p>
@@ -2993,7 +2993,7 @@
           <a:p>
             <a:fld id="{232F3880-77D8-4D9E-BC7C-9E52EB9D8497}" type="datetimeFigureOut">
               <a:rPr lang="es-ES" smtClean="0"/>
-              <a:t>05/04/2020</a:t>
+              <a:t>07/04/2020</a:t>
             </a:fld>
             <a:endParaRPr lang="es-ES"/>
           </a:p>
@@ -3164,7 +3164,7 @@
           <a:p>
             <a:fld id="{232F3880-77D8-4D9E-BC7C-9E52EB9D8497}" type="datetimeFigureOut">
               <a:rPr lang="es-ES" smtClean="0"/>
-              <a:t>05/04/2020</a:t>
+              <a:t>07/04/2020</a:t>
             </a:fld>
             <a:endParaRPr lang="es-ES"/>
           </a:p>
@@ -3518,7 +3518,7 @@
           <a:p>
             <a:fld id="{232F3880-77D8-4D9E-BC7C-9E52EB9D8497}" type="datetimeFigureOut">
               <a:rPr lang="es-ES" smtClean="0"/>
-              <a:t>05/04/2020</a:t>
+              <a:t>07/04/2020</a:t>
             </a:fld>
             <a:endParaRPr lang="es-ES"/>
           </a:p>
@@ -3900,7 +3900,7 @@
           <a:p>
             <a:fld id="{232F3880-77D8-4D9E-BC7C-9E52EB9D8497}" type="datetimeFigureOut">
               <a:rPr lang="es-ES" smtClean="0"/>
-              <a:t>05/04/2020</a:t>
+              <a:t>07/04/2020</a:t>
             </a:fld>
             <a:endParaRPr lang="es-ES"/>
           </a:p>
@@ -4187,7 +4187,7 @@
           <a:p>
             <a:fld id="{232F3880-77D8-4D9E-BC7C-9E52EB9D8497}" type="datetimeFigureOut">
               <a:rPr lang="es-ES" smtClean="0"/>
-              <a:t>05/04/2020</a:t>
+              <a:t>07/04/2020</a:t>
             </a:fld>
             <a:endParaRPr lang="es-ES"/>
           </a:p>
@@ -32401,7 +32401,7 @@
         <p:spPr/>
         <p:txBody>
           <a:bodyPr>
-            <a:normAutofit lnSpcReduction="10000"/>
+            <a:normAutofit fontScale="92500" lnSpcReduction="10000"/>
           </a:bodyPr>
           <a:lstStyle/>
           <a:p>
@@ -32589,6 +32589,28 @@
                 <a:hlinkClick r:id="rId11"/>
               </a:rPr>
               <a:t>https://developers.google.com/web/fundamentals/primers/promises</a:t>
+            </a:r>
+            <a:endParaRPr lang="es-ES" dirty="0"/>
+          </a:p>
+          <a:p>
+            <a:pPr lvl="1">
+              <a:lnSpc>
+                <a:spcPct val="100000"/>
+              </a:lnSpc>
+            </a:pPr>
+            <a:r>
+              <a:rPr lang="en-US" i="1" dirty="0"/>
+              <a:t>Fast load times:</a:t>
+            </a:r>
+            <a:r>
+              <a:rPr lang="en-US" dirty="0"/>
+              <a:t> </a:t>
+            </a:r>
+            <a:r>
+              <a:rPr lang="en-US" dirty="0">
+                <a:hlinkClick r:id="rId12"/>
+              </a:rPr>
+              <a:t>https://web.dev/fast/</a:t>
             </a:r>
             <a:endParaRPr lang="es-ES" dirty="0"/>
           </a:p>

</xml_diff>